<commit_message>
ajout du rapport d exploration des données
</commit_message>
<xml_diff>
--- a/Optimisation_Algorithme_Investissement.pptx
+++ b/Optimisation_Algorithme_Investissement.pptx
@@ -11,7 +11,9 @@
     <p:sldId id="259" r:id="rId5"/>
     <p:sldId id="262" r:id="rId6"/>
     <p:sldId id="260" r:id="rId7"/>
-    <p:sldId id="261" r:id="rId8"/>
+    <p:sldId id="263" r:id="rId8"/>
+    <p:sldId id="264" r:id="rId9"/>
+    <p:sldId id="261" r:id="rId10"/>
   </p:sldIdLst>
   <p:sldSz cx="9144000" cy="6858000" type="screen4x3"/>
   <p:notesSz cx="6858000" cy="9144000"/>
@@ -308,7 +310,7 @@
           <a:p>
             <a:fld id="{5BCAD085-E8A6-8845-BD4E-CB4CCA059FC4}" type="datetimeFigureOut">
               <a:rPr lang="en-US" smtClean="0"/>
-              <a:t>5/22/2025</a:t>
+              <a:t>5/30/2025</a:t>
             </a:fld>
             <a:endParaRPr lang="en-US"/>
           </a:p>
@@ -476,7 +478,7 @@
           <a:p>
             <a:fld id="{5BCAD085-E8A6-8845-BD4E-CB4CCA059FC4}" type="datetimeFigureOut">
               <a:rPr lang="en-US" smtClean="0"/>
-              <a:t>5/22/2025</a:t>
+              <a:t>5/30/2025</a:t>
             </a:fld>
             <a:endParaRPr lang="en-US"/>
           </a:p>
@@ -654,7 +656,7 @@
           <a:p>
             <a:fld id="{5BCAD085-E8A6-8845-BD4E-CB4CCA059FC4}" type="datetimeFigureOut">
               <a:rPr lang="en-US" smtClean="0"/>
-              <a:t>5/22/2025</a:t>
+              <a:t>5/30/2025</a:t>
             </a:fld>
             <a:endParaRPr lang="en-US"/>
           </a:p>
@@ -822,7 +824,7 @@
           <a:p>
             <a:fld id="{5BCAD085-E8A6-8845-BD4E-CB4CCA059FC4}" type="datetimeFigureOut">
               <a:rPr lang="en-US" smtClean="0"/>
-              <a:t>5/22/2025</a:t>
+              <a:t>5/30/2025</a:t>
             </a:fld>
             <a:endParaRPr lang="en-US"/>
           </a:p>
@@ -1067,7 +1069,7 @@
           <a:p>
             <a:fld id="{5BCAD085-E8A6-8845-BD4E-CB4CCA059FC4}" type="datetimeFigureOut">
               <a:rPr lang="en-US" smtClean="0"/>
-              <a:t>5/22/2025</a:t>
+              <a:t>5/30/2025</a:t>
             </a:fld>
             <a:endParaRPr lang="en-US"/>
           </a:p>
@@ -1352,7 +1354,7 @@
           <a:p>
             <a:fld id="{5BCAD085-E8A6-8845-BD4E-CB4CCA059FC4}" type="datetimeFigureOut">
               <a:rPr lang="en-US" smtClean="0"/>
-              <a:t>5/22/2025</a:t>
+              <a:t>5/30/2025</a:t>
             </a:fld>
             <a:endParaRPr lang="en-US"/>
           </a:p>
@@ -1771,7 +1773,7 @@
           <a:p>
             <a:fld id="{5BCAD085-E8A6-8845-BD4E-CB4CCA059FC4}" type="datetimeFigureOut">
               <a:rPr lang="en-US" smtClean="0"/>
-              <a:t>5/22/2025</a:t>
+              <a:t>5/30/2025</a:t>
             </a:fld>
             <a:endParaRPr lang="en-US"/>
           </a:p>
@@ -1888,7 +1890,7 @@
           <a:p>
             <a:fld id="{5BCAD085-E8A6-8845-BD4E-CB4CCA059FC4}" type="datetimeFigureOut">
               <a:rPr lang="en-US" smtClean="0"/>
-              <a:t>5/22/2025</a:t>
+              <a:t>5/30/2025</a:t>
             </a:fld>
             <a:endParaRPr lang="en-US"/>
           </a:p>
@@ -1983,7 +1985,7 @@
           <a:p>
             <a:fld id="{5BCAD085-E8A6-8845-BD4E-CB4CCA059FC4}" type="datetimeFigureOut">
               <a:rPr lang="en-US" smtClean="0"/>
-              <a:t>5/22/2025</a:t>
+              <a:t>5/30/2025</a:t>
             </a:fld>
             <a:endParaRPr lang="en-US"/>
           </a:p>
@@ -2258,7 +2260,7 @@
           <a:p>
             <a:fld id="{5BCAD085-E8A6-8845-BD4E-CB4CCA059FC4}" type="datetimeFigureOut">
               <a:rPr lang="en-US" smtClean="0"/>
-              <a:t>5/22/2025</a:t>
+              <a:t>5/30/2025</a:t>
             </a:fld>
             <a:endParaRPr lang="en-US"/>
           </a:p>
@@ -2510,7 +2512,7 @@
           <a:p>
             <a:fld id="{5BCAD085-E8A6-8845-BD4E-CB4CCA059FC4}" type="datetimeFigureOut">
               <a:rPr lang="en-US" smtClean="0"/>
-              <a:t>5/22/2025</a:t>
+              <a:t>5/30/2025</a:t>
             </a:fld>
             <a:endParaRPr lang="en-US"/>
           </a:p>
@@ -2721,7 +2723,7 @@
           <a:p>
             <a:fld id="{5BCAD085-E8A6-8845-BD4E-CB4CCA059FC4}" type="datetimeFigureOut">
               <a:rPr lang="en-US" smtClean="0"/>
-              <a:t>5/22/2025</a:t>
+              <a:t>5/30/2025</a:t>
             </a:fld>
             <a:endParaRPr lang="en-US"/>
           </a:p>
@@ -4056,6 +4058,308 @@
 </file>
 
 <file path=ppt/slides/slide7.xml><?xml version="1.0" encoding="utf-8"?>
+<p:sld xmlns:a="http://schemas.openxmlformats.org/drawingml/2006/main" xmlns:r="http://schemas.openxmlformats.org/officeDocument/2006/relationships" xmlns:p="http://schemas.openxmlformats.org/presentationml/2006/main">
+  <p:cSld>
+    <p:spTree>
+      <p:nvGrpSpPr>
+        <p:cNvPr id="1" name=""/>
+        <p:cNvGrpSpPr/>
+        <p:nvPr/>
+      </p:nvGrpSpPr>
+      <p:grpSpPr>
+        <a:xfrm>
+          <a:off x="0" y="0"/>
+          <a:ext cx="0" cy="0"/>
+          <a:chOff x="0" y="0"/>
+          <a:chExt cx="0" cy="0"/>
+        </a:xfrm>
+      </p:grpSpPr>
+      <p:sp>
+        <p:nvSpPr>
+          <p:cNvPr id="2" name="Title 1"/>
+          <p:cNvSpPr>
+            <a:spLocks noGrp="1"/>
+          </p:cNvSpPr>
+          <p:nvPr>
+            <p:ph type="title"/>
+          </p:nvPr>
+        </p:nvSpPr>
+        <p:spPr/>
+        <p:txBody>
+          <a:bodyPr/>
+          <a:lstStyle/>
+          <a:p>
+            <a:r>
+              <a:t>Comparaison Résultats – Dataset 1</a:t>
+            </a:r>
+          </a:p>
+        </p:txBody>
+      </p:sp>
+      <p:sp>
+        <p:nvSpPr>
+          <p:cNvPr id="3" name="TextBox 2"/>
+          <p:cNvSpPr txBox="1"/>
+          <p:nvPr/>
+        </p:nvSpPr>
+        <p:spPr>
+          <a:xfrm>
+            <a:off x="914400" y="1371600"/>
+            <a:ext cx="7315200" cy="4572000"/>
+          </a:xfrm>
+          <a:prstGeom prst="rect">
+            <a:avLst/>
+          </a:prstGeom>
+          <a:noFill/>
+        </p:spPr>
+        <p:txBody>
+          <a:bodyPr wrap="none">
+            <a:spAutoFit/>
+          </a:bodyPr>
+          <a:lstStyle/>
+          <a:p>
+            <a:r>
+              <a:rPr sz="1800">
+                <a:solidFill>
+                  <a:srgbClr val="000000"/>
+                </a:solidFill>
+                <a:latin typeface="Calibri"/>
+              </a:rPr>
+              <a:t>🔹 Choix de Sienna :
+- Coût total : 498.76 €
+- Profit total : 196.61 €
+- Rendement : 39.42%
+🔹 Algorithme optimisé :
+- Coût total : 499.96 €
+- Profit total : 198.55 €
+- Rendement : 39.71%
+📌 Actions communes sélectionnées : 0</a:t>
+            </a:r>
+          </a:p>
+        </p:txBody>
+      </p:sp>
+    </p:spTree>
+  </p:cSld>
+  <p:clrMapOvr>
+    <a:masterClrMapping/>
+  </p:clrMapOvr>
+</p:sld>
+</file>
+
+<file path=ppt/slides/slide8.xml><?xml version="1.0" encoding="utf-8"?>
+<p:sld xmlns:a="http://schemas.openxmlformats.org/drawingml/2006/main" xmlns:r="http://schemas.openxmlformats.org/officeDocument/2006/relationships" xmlns:p="http://schemas.openxmlformats.org/presentationml/2006/main">
+  <p:cSld>
+    <p:spTree>
+      <p:nvGrpSpPr>
+        <p:cNvPr id="1" name=""/>
+        <p:cNvGrpSpPr/>
+        <p:nvPr/>
+      </p:nvGrpSpPr>
+      <p:grpSpPr>
+        <a:xfrm>
+          <a:off x="0" y="0"/>
+          <a:ext cx="0" cy="0"/>
+          <a:chOff x="0" y="0"/>
+          <a:chExt cx="0" cy="0"/>
+        </a:xfrm>
+      </p:grpSpPr>
+      <p:sp>
+        <p:nvSpPr>
+          <p:cNvPr id="2" name="Title 1"/>
+          <p:cNvSpPr>
+            <a:spLocks noGrp="1"/>
+          </p:cNvSpPr>
+          <p:nvPr>
+            <p:ph type="title"/>
+          </p:nvPr>
+        </p:nvSpPr>
+        <p:spPr/>
+        <p:txBody>
+          <a:bodyPr/>
+          <a:lstStyle/>
+          <a:p>
+            <a:r>
+              <a:t>Comparaison Résultats – Dataset 2</a:t>
+            </a:r>
+          </a:p>
+        </p:txBody>
+      </p:sp>
+      <p:sp>
+        <p:nvSpPr>
+          <p:cNvPr id="3" name="TextBox 2"/>
+          <p:cNvSpPr txBox="1"/>
+          <p:nvPr/>
+        </p:nvSpPr>
+        <p:spPr>
+          <a:xfrm>
+            <a:off x="914400" y="1371600"/>
+            <a:ext cx="7315200" cy="4572000"/>
+          </a:xfrm>
+          <a:prstGeom prst="rect">
+            <a:avLst/>
+          </a:prstGeom>
+          <a:noFill/>
+        </p:spPr>
+        <p:txBody>
+          <a:bodyPr wrap="none">
+            <a:spAutoFit/>
+          </a:bodyPr>
+          <a:lstStyle/>
+          <a:p>
+            <a:r>
+              <a:rPr sz="1800" dirty="0">
+                <a:solidFill>
+                  <a:srgbClr val="000000"/>
+                </a:solidFill>
+                <a:latin typeface="Calibri"/>
+              </a:rPr>
+              <a:t>🔹 Choix de Sienna :
+- </a:t>
+            </a:r>
+            <a:r>
+              <a:rPr sz="1800" dirty="0" err="1">
+                <a:solidFill>
+                  <a:srgbClr val="000000"/>
+                </a:solidFill>
+                <a:latin typeface="Calibri"/>
+              </a:rPr>
+              <a:t>Coût</a:t>
+            </a:r>
+            <a:r>
+              <a:rPr sz="1800" dirty="0">
+                <a:solidFill>
+                  <a:srgbClr val="000000"/>
+                </a:solidFill>
+                <a:latin typeface="Calibri"/>
+              </a:rPr>
+              <a:t> total : 489.24 €
+- Profit total : 193.78 €
+- </a:t>
+            </a:r>
+            <a:r>
+              <a:rPr sz="1800" dirty="0" err="1">
+                <a:solidFill>
+                  <a:srgbClr val="000000"/>
+                </a:solidFill>
+                <a:latin typeface="Calibri"/>
+              </a:rPr>
+              <a:t>Rendement</a:t>
+            </a:r>
+            <a:r>
+              <a:rPr sz="1800" dirty="0">
+                <a:solidFill>
+                  <a:srgbClr val="000000"/>
+                </a:solidFill>
+                <a:latin typeface="Calibri"/>
+              </a:rPr>
+              <a:t> : 39.61%
+🔹 </a:t>
+            </a:r>
+            <a:r>
+              <a:rPr sz="1800" dirty="0" err="1">
+                <a:solidFill>
+                  <a:srgbClr val="000000"/>
+                </a:solidFill>
+                <a:latin typeface="Calibri"/>
+              </a:rPr>
+              <a:t>Algorithme</a:t>
+            </a:r>
+            <a:r>
+              <a:rPr sz="1800" dirty="0">
+                <a:solidFill>
+                  <a:srgbClr val="000000"/>
+                </a:solidFill>
+                <a:latin typeface="Calibri"/>
+              </a:rPr>
+              <a:t> </a:t>
+            </a:r>
+            <a:r>
+              <a:rPr sz="1800" dirty="0" err="1">
+                <a:solidFill>
+                  <a:srgbClr val="000000"/>
+                </a:solidFill>
+                <a:latin typeface="Calibri"/>
+              </a:rPr>
+              <a:t>optimisé</a:t>
+            </a:r>
+            <a:r>
+              <a:rPr sz="1800" dirty="0">
+                <a:solidFill>
+                  <a:srgbClr val="000000"/>
+                </a:solidFill>
+                <a:latin typeface="Calibri"/>
+              </a:rPr>
+              <a:t> :
+- </a:t>
+            </a:r>
+            <a:r>
+              <a:rPr sz="1800" dirty="0" err="1">
+                <a:solidFill>
+                  <a:srgbClr val="000000"/>
+                </a:solidFill>
+                <a:latin typeface="Calibri"/>
+              </a:rPr>
+              <a:t>Coût</a:t>
+            </a:r>
+            <a:r>
+              <a:rPr sz="1800" dirty="0">
+                <a:solidFill>
+                  <a:srgbClr val="000000"/>
+                </a:solidFill>
+                <a:latin typeface="Calibri"/>
+              </a:rPr>
+              <a:t> total : 499.92 €
+- Profit total : 197.96 €
+- </a:t>
+            </a:r>
+            <a:r>
+              <a:rPr sz="1800" dirty="0" err="1">
+                <a:solidFill>
+                  <a:srgbClr val="000000"/>
+                </a:solidFill>
+                <a:latin typeface="Calibri"/>
+              </a:rPr>
+              <a:t>Rendement</a:t>
+            </a:r>
+            <a:r>
+              <a:rPr sz="1800" dirty="0">
+                <a:solidFill>
+                  <a:srgbClr val="000000"/>
+                </a:solidFill>
+                <a:latin typeface="Calibri"/>
+              </a:rPr>
+              <a:t> : 39.60%
+📌 Actions communes </a:t>
+            </a:r>
+            <a:r>
+              <a:rPr sz="1800" dirty="0" err="1">
+                <a:solidFill>
+                  <a:srgbClr val="000000"/>
+                </a:solidFill>
+                <a:latin typeface="Calibri"/>
+              </a:rPr>
+              <a:t>sélectionnées</a:t>
+            </a:r>
+            <a:r>
+              <a:rPr sz="1800" dirty="0">
+                <a:solidFill>
+                  <a:srgbClr val="000000"/>
+                </a:solidFill>
+                <a:latin typeface="Calibri"/>
+              </a:rPr>
+              <a:t> : 18</a:t>
+            </a:r>
+          </a:p>
+        </p:txBody>
+      </p:sp>
+    </p:spTree>
+  </p:cSld>
+  <p:clrMapOvr>
+    <a:masterClrMapping/>
+  </p:clrMapOvr>
+</p:sld>
+</file>
+
+<file path=ppt/slides/slide9.xml><?xml version="1.0" encoding="utf-8"?>
 <p:sld xmlns:a="http://schemas.openxmlformats.org/drawingml/2006/main" xmlns:r="http://schemas.openxmlformats.org/officeDocument/2006/relationships" xmlns:p="http://schemas.openxmlformats.org/presentationml/2006/main">
   <p:cSld>
     <p:spTree>

</xml_diff>